<commit_message>
-Finished PPT for hw5
</commit_message>
<xml_diff>
--- a/CS3340 - Computer Architecture/hw5/mgm160130.pptx
+++ b/CS3340 - Computer Architecture/hw5/mgm160130.pptx
@@ -13,6 +13,10 @@
     <p:sldId id="261" r:id="rId7"/>
     <p:sldId id="262" r:id="rId8"/>
     <p:sldId id="263" r:id="rId9"/>
+    <p:sldId id="265" r:id="rId10"/>
+    <p:sldId id="264" r:id="rId11"/>
+    <p:sldId id="266" r:id="rId12"/>
+    <p:sldId id="267" r:id="rId13"/>
   </p:sldIdLst>
   <p:sldSz cx="12192000" cy="6858000"/>
   <p:notesSz cx="6858000" cy="9144000"/>
@@ -124,12 +128,23 @@
             <p14:sldId id="261"/>
             <p14:sldId id="262"/>
             <p14:sldId id="263"/>
+            <p14:sldId id="265"/>
+            <p14:sldId id="264"/>
+            <p14:sldId id="266"/>
+            <p14:sldId id="267"/>
           </p14:sldIdLst>
         </p14:section>
       </p14:sectionLst>
     </p:ext>
+    <p:ext uri="{EFAFB233-063F-42B5-8137-9DF3F51BA10A}">
+      <p15:sldGuideLst xmlns:p15="http://schemas.microsoft.com/office/powerpoint/2012/main"/>
+    </p:ext>
   </p:extLst>
 </p:presentation>
+</file>
+
+<file path=ppt/revisionInfo.xml><?xml version="1.0" encoding="utf-8"?>
+<p1510:revInfo xmlns:a="http://schemas.openxmlformats.org/drawingml/2006/main" xmlns:r="http://schemas.openxmlformats.org/officeDocument/2006/relationships" xmlns:p1510="http://schemas.microsoft.com/office/powerpoint/2015/10/main"/>
 </file>
 
 <file path=ppt/slideLayouts/slideLayout1.xml><?xml version="1.0" encoding="utf-8"?>
@@ -321,7 +336,7 @@
             <a:fld id="{B61BEF0D-F0BB-DE4B-95CE-6DB70DBA9567}" type="datetimeFigureOut">
               <a:rPr lang="en-US" dirty="0"/>
               <a:pPr/>
-              <a:t>10/26/2017</a:t>
+              <a:t>10/27/2017</a:t>
             </a:fld>
             <a:endParaRPr lang="en-US" dirty="0"/>
           </a:p>
@@ -656,7 +671,7 @@
             <a:fld id="{B61BEF0D-F0BB-DE4B-95CE-6DB70DBA9567}" type="datetimeFigureOut">
               <a:rPr lang="en-US" dirty="0"/>
               <a:pPr/>
-              <a:t>10/26/2017</a:t>
+              <a:t>10/27/2017</a:t>
             </a:fld>
             <a:endParaRPr lang="en-US" dirty="0"/>
           </a:p>
@@ -1054,7 +1069,7 @@
             <a:fld id="{B61BEF0D-F0BB-DE4B-95CE-6DB70DBA9567}" type="datetimeFigureOut">
               <a:rPr lang="en-US" dirty="0"/>
               <a:pPr/>
-              <a:t>10/26/2017</a:t>
+              <a:t>10/27/2017</a:t>
             </a:fld>
             <a:endParaRPr lang="en-US" dirty="0"/>
           </a:p>
@@ -1387,7 +1402,7 @@
             <a:fld id="{B61BEF0D-F0BB-DE4B-95CE-6DB70DBA9567}" type="datetimeFigureOut">
               <a:rPr lang="en-US" dirty="0"/>
               <a:pPr/>
-              <a:t>10/26/2017</a:t>
+              <a:t>10/27/2017</a:t>
             </a:fld>
             <a:endParaRPr lang="en-US" dirty="0"/>
           </a:p>
@@ -1704,7 +1719,7 @@
             <a:fld id="{B61BEF0D-F0BB-DE4B-95CE-6DB70DBA9567}" type="datetimeFigureOut">
               <a:rPr lang="en-US" dirty="0"/>
               <a:pPr/>
-              <a:t>10/26/2017</a:t>
+              <a:t>10/27/2017</a:t>
             </a:fld>
             <a:endParaRPr lang="en-US" dirty="0"/>
           </a:p>
@@ -2097,7 +2112,7 @@
             <a:fld id="{B61BEF0D-F0BB-DE4B-95CE-6DB70DBA9567}" type="datetimeFigureOut">
               <a:rPr lang="en-US" dirty="0"/>
               <a:pPr/>
-              <a:t>10/26/2017</a:t>
+              <a:t>10/27/2017</a:t>
             </a:fld>
             <a:endParaRPr lang="en-US" dirty="0"/>
           </a:p>
@@ -2351,7 +2366,7 @@
             <a:fld id="{B61BEF0D-F0BB-DE4B-95CE-6DB70DBA9567}" type="datetimeFigureOut">
               <a:rPr lang="en-US" dirty="0"/>
               <a:pPr/>
-              <a:t>10/26/2017</a:t>
+              <a:t>10/27/2017</a:t>
             </a:fld>
             <a:endParaRPr lang="en-US" dirty="0"/>
           </a:p>
@@ -2610,7 +2625,7 @@
             <a:fld id="{B61BEF0D-F0BB-DE4B-95CE-6DB70DBA9567}" type="datetimeFigureOut">
               <a:rPr lang="en-US" dirty="0"/>
               <a:pPr/>
-              <a:t>10/26/2017</a:t>
+              <a:t>10/27/2017</a:t>
             </a:fld>
             <a:endParaRPr lang="en-US" dirty="0"/>
           </a:p>
@@ -2869,7 +2884,7 @@
             <a:fld id="{B61BEF0D-F0BB-DE4B-95CE-6DB70DBA9567}" type="datetimeFigureOut">
               <a:rPr lang="en-US" dirty="0"/>
               <a:pPr/>
-              <a:t>10/26/2017</a:t>
+              <a:t>10/27/2017</a:t>
             </a:fld>
             <a:endParaRPr lang="en-US" dirty="0"/>
           </a:p>
@@ -3195,7 +3210,7 @@
             <a:fld id="{B61BEF0D-F0BB-DE4B-95CE-6DB70DBA9567}" type="datetimeFigureOut">
               <a:rPr lang="en-US" dirty="0"/>
               <a:pPr/>
-              <a:t>10/26/2017</a:t>
+              <a:t>10/27/2017</a:t>
             </a:fld>
             <a:endParaRPr lang="en-US" dirty="0"/>
           </a:p>
@@ -3515,7 +3530,7 @@
             <a:fld id="{B61BEF0D-F0BB-DE4B-95CE-6DB70DBA9567}" type="datetimeFigureOut">
               <a:rPr lang="en-US" dirty="0"/>
               <a:pPr/>
-              <a:t>10/26/2017</a:t>
+              <a:t>10/27/2017</a:t>
             </a:fld>
             <a:endParaRPr lang="en-US" dirty="0"/>
           </a:p>
@@ -3969,7 +3984,7 @@
             <a:fld id="{B61BEF0D-F0BB-DE4B-95CE-6DB70DBA9567}" type="datetimeFigureOut">
               <a:rPr lang="en-US" dirty="0"/>
               <a:pPr/>
-              <a:t>10/26/2017</a:t>
+              <a:t>10/27/2017</a:t>
             </a:fld>
             <a:endParaRPr lang="en-US" dirty="0"/>
           </a:p>
@@ -4171,7 +4186,7 @@
             <a:fld id="{B61BEF0D-F0BB-DE4B-95CE-6DB70DBA9567}" type="datetimeFigureOut">
               <a:rPr lang="en-US" dirty="0"/>
               <a:pPr/>
-              <a:t>10/26/2017</a:t>
+              <a:t>10/27/2017</a:t>
             </a:fld>
             <a:endParaRPr lang="en-US" dirty="0"/>
           </a:p>
@@ -4345,7 +4360,7 @@
             <a:fld id="{B61BEF0D-F0BB-DE4B-95CE-6DB70DBA9567}" type="datetimeFigureOut">
               <a:rPr lang="en-US" dirty="0"/>
               <a:pPr/>
-              <a:t>10/26/2017</a:t>
+              <a:t>10/27/2017</a:t>
             </a:fld>
             <a:endParaRPr lang="en-US" dirty="0"/>
           </a:p>
@@ -4675,7 +4690,7 @@
             <a:fld id="{B61BEF0D-F0BB-DE4B-95CE-6DB70DBA9567}" type="datetimeFigureOut">
               <a:rPr lang="en-US" dirty="0"/>
               <a:pPr/>
-              <a:t>10/26/2017</a:t>
+              <a:t>10/27/2017</a:t>
             </a:fld>
             <a:endParaRPr lang="en-US" dirty="0"/>
           </a:p>
@@ -5017,7 +5032,7 @@
             <a:fld id="{B61BEF0D-F0BB-DE4B-95CE-6DB70DBA9567}" type="datetimeFigureOut">
               <a:rPr lang="en-US" dirty="0"/>
               <a:pPr/>
-              <a:t>10/26/2017</a:t>
+              <a:t>10/27/2017</a:t>
             </a:fld>
             <a:endParaRPr lang="en-US" dirty="0"/>
           </a:p>
@@ -7068,7 +7083,7 @@
             <a:fld id="{B61BEF0D-F0BB-DE4B-95CE-6DB70DBA9567}" type="datetimeFigureOut">
               <a:rPr lang="en-US" dirty="0"/>
               <a:pPr/>
-              <a:t>10/26/2017</a:t>
+              <a:t>10/27/2017</a:t>
             </a:fld>
             <a:endParaRPr lang="en-US" dirty="0"/>
           </a:p>
@@ -7656,6 +7671,467 @@
   <p:clrMapOvr>
     <a:masterClrMapping/>
   </p:clrMapOvr>
+  <mc:AlternateContent xmlns:mc="http://schemas.openxmlformats.org/markup-compatibility/2006">
+    <mc:Choice xmlns:p14="http://schemas.microsoft.com/office/powerpoint/2010/main" Requires="p14">
+      <p:transition p14:dur="10"/>
+    </mc:Choice>
+    <mc:Fallback>
+      <p:transition/>
+    </mc:Fallback>
+  </mc:AlternateContent>
+</p:sld>
+</file>
+
+<file path=ppt/slides/slide10.xml><?xml version="1.0" encoding="utf-8"?>
+<p:sld xmlns:a="http://schemas.openxmlformats.org/drawingml/2006/main" xmlns:r="http://schemas.openxmlformats.org/officeDocument/2006/relationships" xmlns:p="http://schemas.openxmlformats.org/presentationml/2006/main">
+  <p:cSld>
+    <p:spTree>
+      <p:nvGrpSpPr>
+        <p:cNvPr id="1" name=""/>
+        <p:cNvGrpSpPr/>
+        <p:nvPr/>
+      </p:nvGrpSpPr>
+      <p:grpSpPr>
+        <a:xfrm>
+          <a:off x="0" y="0"/>
+          <a:ext cx="0" cy="0"/>
+          <a:chOff x="0" y="0"/>
+          <a:chExt cx="0" cy="0"/>
+        </a:xfrm>
+      </p:grpSpPr>
+      <p:sp>
+        <p:nvSpPr>
+          <p:cNvPr id="2" name="Title 1">
+            <a:extLst>
+              <a:ext uri="{FF2B5EF4-FFF2-40B4-BE49-F238E27FC236}">
+                <a16:creationId xmlns:a16="http://schemas.microsoft.com/office/drawing/2014/main" id="{A30240F2-F9D7-4ECA-B516-078C804E5688}"/>
+              </a:ext>
+            </a:extLst>
+          </p:cNvPr>
+          <p:cNvSpPr>
+            <a:spLocks noGrp="1"/>
+          </p:cNvSpPr>
+          <p:nvPr>
+            <p:ph type="title"/>
+          </p:nvPr>
+        </p:nvSpPr>
+        <p:spPr/>
+        <p:txBody>
+          <a:bodyPr/>
+          <a:lstStyle/>
+          <a:p>
+            <a:r>
+              <a:rPr lang="en-US" dirty="0"/>
+              <a:t>How Does It Work?:</a:t>
+            </a:r>
+            <a:br>
+              <a:rPr lang="en-US" dirty="0"/>
+            </a:br>
+            <a:r>
+              <a:rPr lang="en-US" dirty="0"/>
+              <a:t>[IOI and IOC] vs [OOI and OOC]</a:t>
+            </a:r>
+          </a:p>
+        </p:txBody>
+      </p:sp>
+      <p:sp>
+        <p:nvSpPr>
+          <p:cNvPr id="3" name="Content Placeholder 2">
+            <a:extLst>
+              <a:ext uri="{FF2B5EF4-FFF2-40B4-BE49-F238E27FC236}">
+                <a16:creationId xmlns:a16="http://schemas.microsoft.com/office/drawing/2014/main" id="{3A04F889-FADF-448E-A8AE-803ECDCA6BD6}"/>
+              </a:ext>
+            </a:extLst>
+          </p:cNvPr>
+          <p:cNvSpPr>
+            <a:spLocks noGrp="1"/>
+          </p:cNvSpPr>
+          <p:nvPr>
+            <p:ph idx="1"/>
+          </p:nvPr>
+        </p:nvSpPr>
+        <p:spPr/>
+        <p:txBody>
+          <a:bodyPr>
+            <a:normAutofit fontScale="92500"/>
+          </a:bodyPr>
+          <a:lstStyle/>
+          <a:p>
+            <a:r>
+              <a:rPr lang="en-US" u="sng" dirty="0"/>
+              <a:t>In-Order Issue(IOI)</a:t>
+            </a:r>
+            <a:r>
+              <a:rPr lang="en-US" dirty="0"/>
+              <a:t> and </a:t>
+            </a:r>
+            <a:r>
+              <a:rPr lang="en-US" u="sng" dirty="0"/>
+              <a:t>In-Order Completion(IOC)</a:t>
+            </a:r>
+            <a:r>
+              <a:rPr lang="en-US" dirty="0"/>
+              <a:t> follows the standard program order, and is completed in the same order (with parallel issue and completion). To guarantee results, the processor will wait when a conflict occurs and when a unit requires more than one cycle to execute. This method is not very efficient, but it simplifies the hardware requirements.</a:t>
+            </a:r>
+          </a:p>
+          <a:p>
+            <a:endParaRPr lang="en-US" u="sng" dirty="0"/>
+          </a:p>
+          <a:p>
+            <a:r>
+              <a:rPr lang="en-US" u="sng" dirty="0"/>
+              <a:t>Out-Of-Order Issue(OOI) </a:t>
+            </a:r>
+            <a:r>
+              <a:rPr lang="en-US" dirty="0"/>
+              <a:t>and </a:t>
+            </a:r>
+            <a:r>
+              <a:rPr lang="en-US" u="sng" dirty="0"/>
+              <a:t>Out-Of-Order Completion (OOC)</a:t>
+            </a:r>
+            <a:r>
+              <a:rPr lang="en-US" dirty="0"/>
+              <a:t> are the main reasons why superscalar architecture is efficient. With in-order issues, no new instruction can be introduced when the processor has detected a conflict, and the processor waits until the conflict has been resolved. However, with out-of-order completion you don’t have to rely on a compiler based technique. Instead, you can take a set of decoded instructions, in any order, and issue any of them as long as the program execution is correct.</a:t>
+            </a:r>
+          </a:p>
+          <a:p>
+            <a:endParaRPr lang="en-US" dirty="0"/>
+          </a:p>
+          <a:p>
+            <a:endParaRPr lang="en-US" dirty="0"/>
+          </a:p>
+        </p:txBody>
+      </p:sp>
+    </p:spTree>
+    <p:extLst>
+      <p:ext uri="{BB962C8B-B14F-4D97-AF65-F5344CB8AC3E}">
+        <p14:creationId xmlns:p14="http://schemas.microsoft.com/office/powerpoint/2010/main" val="3644132643"/>
+      </p:ext>
+    </p:extLst>
+  </p:cSld>
+  <p:clrMapOvr>
+    <a:masterClrMapping/>
+  </p:clrMapOvr>
+</p:sld>
+</file>
+
+<file path=ppt/slides/slide11.xml><?xml version="1.0" encoding="utf-8"?>
+<p:sld xmlns:a="http://schemas.openxmlformats.org/drawingml/2006/main" xmlns:r="http://schemas.openxmlformats.org/officeDocument/2006/relationships" xmlns:p="http://schemas.openxmlformats.org/presentationml/2006/main">
+  <p:cSld>
+    <p:spTree>
+      <p:nvGrpSpPr>
+        <p:cNvPr id="1" name=""/>
+        <p:cNvGrpSpPr/>
+        <p:nvPr/>
+      </p:nvGrpSpPr>
+      <p:grpSpPr>
+        <a:xfrm>
+          <a:off x="0" y="0"/>
+          <a:ext cx="0" cy="0"/>
+          <a:chOff x="0" y="0"/>
+          <a:chExt cx="0" cy="0"/>
+        </a:xfrm>
+      </p:grpSpPr>
+      <p:sp>
+        <p:nvSpPr>
+          <p:cNvPr id="2" name="Title 1">
+            <a:extLst>
+              <a:ext uri="{FF2B5EF4-FFF2-40B4-BE49-F238E27FC236}">
+                <a16:creationId xmlns:a16="http://schemas.microsoft.com/office/drawing/2014/main" id="{925C13BF-32C5-42D9-8507-AFDCA1640C14}"/>
+              </a:ext>
+            </a:extLst>
+          </p:cNvPr>
+          <p:cNvSpPr>
+            <a:spLocks noGrp="1"/>
+          </p:cNvSpPr>
+          <p:nvPr>
+            <p:ph type="title"/>
+          </p:nvPr>
+        </p:nvSpPr>
+        <p:spPr/>
+        <p:txBody>
+          <a:bodyPr/>
+          <a:lstStyle/>
+          <a:p>
+            <a:r>
+              <a:rPr lang="en-US" dirty="0"/>
+              <a:t>Summary</a:t>
+            </a:r>
+          </a:p>
+        </p:txBody>
+      </p:sp>
+      <p:sp>
+        <p:nvSpPr>
+          <p:cNvPr id="3" name="Content Placeholder 2">
+            <a:extLst>
+              <a:ext uri="{FF2B5EF4-FFF2-40B4-BE49-F238E27FC236}">
+                <a16:creationId xmlns:a16="http://schemas.microsoft.com/office/drawing/2014/main" id="{C031C148-314F-4AB0-8942-98214FCEA00F}"/>
+              </a:ext>
+            </a:extLst>
+          </p:cNvPr>
+          <p:cNvSpPr>
+            <a:spLocks noGrp="1"/>
+          </p:cNvSpPr>
+          <p:nvPr>
+            <p:ph idx="1"/>
+          </p:nvPr>
+        </p:nvSpPr>
+        <p:spPr/>
+        <p:txBody>
+          <a:bodyPr>
+            <a:normAutofit lnSpcReduction="10000"/>
+          </a:bodyPr>
+          <a:lstStyle/>
+          <a:p>
+            <a:r>
+              <a:rPr lang="en-US" dirty="0"/>
+              <a:t>Techniques that allow for Superscalar architecture to be relevant and have been proven to enhance performance:</a:t>
+            </a:r>
+          </a:p>
+          <a:p>
+            <a:pPr marL="800100" lvl="1" indent="-342900">
+              <a:buFont typeface="+mj-lt"/>
+              <a:buAutoNum type="arabicPeriod"/>
+            </a:pPr>
+            <a:r>
+              <a:rPr lang="en-US" dirty="0"/>
+              <a:t>Out-Of-Order Issue  and Out-Of-Order Completion</a:t>
+            </a:r>
+          </a:p>
+          <a:p>
+            <a:pPr marL="800100" lvl="1" indent="-342900">
+              <a:buFont typeface="+mj-lt"/>
+              <a:buAutoNum type="arabicPeriod"/>
+            </a:pPr>
+            <a:r>
+              <a:rPr lang="en-US" dirty="0"/>
+              <a:t>Register Renaming</a:t>
+            </a:r>
+          </a:p>
+          <a:p>
+            <a:pPr marL="800100" lvl="1" indent="-342900">
+              <a:buFont typeface="+mj-lt"/>
+              <a:buAutoNum type="arabicPeriod"/>
+            </a:pPr>
+            <a:r>
+              <a:rPr lang="en-US" dirty="0"/>
+              <a:t>Parallel Pipelining (</a:t>
+            </a:r>
+            <a:r>
+              <a:rPr lang="en-US" dirty="0" err="1"/>
+              <a:t>Superpipelining</a:t>
+            </a:r>
+            <a:r>
+              <a:rPr lang="en-US" dirty="0"/>
+              <a:t>)</a:t>
+            </a:r>
+          </a:p>
+          <a:p>
+            <a:endParaRPr lang="en-US" dirty="0"/>
+          </a:p>
+          <a:p>
+            <a:r>
+              <a:rPr lang="en-US" dirty="0"/>
+              <a:t>Things to be cautious about when attempting to use/create Superscalar Architecture:</a:t>
+            </a:r>
+          </a:p>
+          <a:p>
+            <a:pPr marL="800100" lvl="1" indent="-342900">
+              <a:buFont typeface="+mj-lt"/>
+              <a:buAutoNum type="arabicPeriod"/>
+            </a:pPr>
+            <a:r>
+              <a:rPr lang="en-US" dirty="0"/>
+              <a:t>Resource Dependencies</a:t>
+            </a:r>
+          </a:p>
+          <a:p>
+            <a:pPr marL="800100" lvl="1" indent="-342900">
+              <a:buFont typeface="+mj-lt"/>
+              <a:buAutoNum type="arabicPeriod"/>
+            </a:pPr>
+            <a:r>
+              <a:rPr lang="en-US" dirty="0"/>
+              <a:t>Control  Dependencies</a:t>
+            </a:r>
+          </a:p>
+          <a:p>
+            <a:pPr marL="800100" lvl="1" indent="-342900">
+              <a:buFont typeface="+mj-lt"/>
+              <a:buAutoNum type="arabicPeriod"/>
+            </a:pPr>
+            <a:r>
+              <a:rPr lang="en-US" dirty="0"/>
+              <a:t>Data Dependencies</a:t>
+            </a:r>
+          </a:p>
+          <a:p>
+            <a:endParaRPr lang="en-US" dirty="0"/>
+          </a:p>
+        </p:txBody>
+      </p:sp>
+    </p:spTree>
+    <p:extLst>
+      <p:ext uri="{BB962C8B-B14F-4D97-AF65-F5344CB8AC3E}">
+        <p14:creationId xmlns:p14="http://schemas.microsoft.com/office/powerpoint/2010/main" val="1959877935"/>
+      </p:ext>
+    </p:extLst>
+  </p:cSld>
+  <p:clrMapOvr>
+    <a:masterClrMapping/>
+  </p:clrMapOvr>
+</p:sld>
+</file>
+
+<file path=ppt/slides/slide12.xml><?xml version="1.0" encoding="utf-8"?>
+<p:sld xmlns:a="http://schemas.openxmlformats.org/drawingml/2006/main" xmlns:r="http://schemas.openxmlformats.org/officeDocument/2006/relationships" xmlns:p="http://schemas.openxmlformats.org/presentationml/2006/main">
+  <p:cSld>
+    <p:spTree>
+      <p:nvGrpSpPr>
+        <p:cNvPr id="1" name=""/>
+        <p:cNvGrpSpPr/>
+        <p:nvPr/>
+      </p:nvGrpSpPr>
+      <p:grpSpPr>
+        <a:xfrm>
+          <a:off x="0" y="0"/>
+          <a:ext cx="0" cy="0"/>
+          <a:chOff x="0" y="0"/>
+          <a:chExt cx="0" cy="0"/>
+        </a:xfrm>
+      </p:grpSpPr>
+      <p:sp>
+        <p:nvSpPr>
+          <p:cNvPr id="2" name="Title 1">
+            <a:extLst>
+              <a:ext uri="{FF2B5EF4-FFF2-40B4-BE49-F238E27FC236}">
+                <a16:creationId xmlns:a16="http://schemas.microsoft.com/office/drawing/2014/main" id="{86A686F7-86AB-4CDC-BD6A-DBACA0124581}"/>
+              </a:ext>
+            </a:extLst>
+          </p:cNvPr>
+          <p:cNvSpPr>
+            <a:spLocks noGrp="1"/>
+          </p:cNvSpPr>
+          <p:nvPr>
+            <p:ph type="title"/>
+          </p:nvPr>
+        </p:nvSpPr>
+        <p:spPr/>
+        <p:txBody>
+          <a:bodyPr/>
+          <a:lstStyle/>
+          <a:p>
+            <a:r>
+              <a:rPr lang="en-US" dirty="0"/>
+              <a:t>Sources</a:t>
+            </a:r>
+          </a:p>
+        </p:txBody>
+      </p:sp>
+      <p:sp>
+        <p:nvSpPr>
+          <p:cNvPr id="3" name="Content Placeholder 2">
+            <a:extLst>
+              <a:ext uri="{FF2B5EF4-FFF2-40B4-BE49-F238E27FC236}">
+                <a16:creationId xmlns:a16="http://schemas.microsoft.com/office/drawing/2014/main" id="{8804B2DD-4DB7-4B77-8606-32D8B4F4089A}"/>
+              </a:ext>
+            </a:extLst>
+          </p:cNvPr>
+          <p:cNvSpPr>
+            <a:spLocks noGrp="1"/>
+          </p:cNvSpPr>
+          <p:nvPr>
+            <p:ph idx="1"/>
+          </p:nvPr>
+        </p:nvSpPr>
+        <p:spPr/>
+        <p:txBody>
+          <a:bodyPr/>
+          <a:lstStyle/>
+          <a:p>
+            <a:endParaRPr lang="en-US" dirty="0"/>
+          </a:p>
+          <a:p>
+            <a:r>
+              <a:rPr lang="en-US" dirty="0"/>
+              <a:t>Peng, Zeng. </a:t>
+            </a:r>
+            <a:r>
+              <a:rPr lang="en-US" i="1" dirty="0"/>
+              <a:t>Superscalar Processors</a:t>
+            </a:r>
+            <a:r>
+              <a:rPr lang="en-US" dirty="0"/>
+              <a:t>. Linköping University / Sweden, 2012, </a:t>
+            </a:r>
+            <a:r>
+              <a:rPr lang="en-US" dirty="0">
+                <a:hlinkClick r:id="rId2"/>
+              </a:rPr>
+              <a:t>www.ida.liu.se/~TDTS08/lectures/12/lec5.pdf</a:t>
+            </a:r>
+            <a:r>
+              <a:rPr lang="en-US" dirty="0"/>
+              <a:t>. (1)</a:t>
+            </a:r>
+          </a:p>
+          <a:p>
+            <a:endParaRPr lang="en-US" dirty="0"/>
+          </a:p>
+          <a:p>
+            <a:r>
+              <a:rPr lang="en-US" dirty="0"/>
+              <a:t>Superscalar processor.” </a:t>
+            </a:r>
+            <a:r>
+              <a:rPr lang="en-US" i="1" dirty="0"/>
+              <a:t>Wikipedia</a:t>
+            </a:r>
+            <a:r>
+              <a:rPr lang="en-US" dirty="0"/>
+              <a:t>, Wikimedia Foundation, 27 Oct. 2017, </a:t>
+            </a:r>
+            <a:r>
+              <a:rPr lang="en-US" dirty="0">
+                <a:hlinkClick r:id="rId3"/>
+              </a:rPr>
+              <a:t>www.en.wikipedia.org/wiki/Superscalar_processor</a:t>
+            </a:r>
+            <a:r>
+              <a:rPr lang="en-US" dirty="0"/>
+              <a:t>. (2)</a:t>
+            </a:r>
+          </a:p>
+          <a:p>
+            <a:endParaRPr lang="en-US" dirty="0"/>
+          </a:p>
+          <a:p>
+            <a:r>
+              <a:rPr lang="en-US" dirty="0"/>
+              <a:t>Brown, Jeff. </a:t>
+            </a:r>
+            <a:r>
+              <a:rPr lang="en-US" i="1" dirty="0"/>
+              <a:t>Pipelining: Branch Hazards</a:t>
+            </a:r>
+            <a:r>
+              <a:rPr lang="en-US" dirty="0"/>
+              <a:t>. University of California San Diego, www.ucsd.edu. (3)</a:t>
+            </a:r>
+          </a:p>
+        </p:txBody>
+      </p:sp>
+    </p:spTree>
+    <p:extLst>
+      <p:ext uri="{BB962C8B-B14F-4D97-AF65-F5344CB8AC3E}">
+        <p14:creationId xmlns:p14="http://schemas.microsoft.com/office/powerpoint/2010/main" val="2294730993"/>
+      </p:ext>
+    </p:extLst>
+  </p:cSld>
+  <p:clrMapOvr>
+    <a:masterClrMapping/>
+  </p:clrMapOvr>
 </p:sld>
 </file>
 
@@ -8191,6 +8667,16 @@
           <a:prstGeom prst="rect">
             <a:avLst/>
           </a:prstGeom>
+          <a:ln>
+            <a:noFill/>
+          </a:ln>
+          <a:effectLst>
+            <a:outerShdw blurRad="190500" algn="tl" rotWithShape="0">
+              <a:srgbClr val="000000">
+                <a:alpha val="70000"/>
+              </a:srgbClr>
+            </a:outerShdw>
+          </a:effectLst>
         </p:spPr>
       </p:pic>
       <p:sp>
@@ -8258,15 +8744,7 @@
           <a:p>
             <a:r>
               <a:rPr lang="en-US" dirty="0"/>
-              <a:t>Most operations are on scalar quantities (about 80% according to </a:t>
-            </a:r>
-            <a:r>
-              <a:rPr lang="en-US" dirty="0" err="1"/>
-              <a:t>Zebo</a:t>
-            </a:r>
-            <a:r>
-              <a:rPr lang="en-US" dirty="0"/>
-              <a:t> Pang). Increasing performance in this area will lead to a huge increase in the overall performance of the system.</a:t>
+              <a:t>Most operations are on scalar quantities (about 80%(1)). Increasing performance in this area will lead to a huge increase in the overall performance of the system.</a:t>
             </a:r>
           </a:p>
           <a:p>
@@ -8741,6 +9219,16 @@
           <a:prstGeom prst="rect">
             <a:avLst/>
           </a:prstGeom>
+          <a:ln>
+            <a:noFill/>
+          </a:ln>
+          <a:effectLst>
+            <a:outerShdw blurRad="190500" algn="tl" rotWithShape="0">
+              <a:srgbClr val="000000">
+                <a:alpha val="70000"/>
+              </a:srgbClr>
+            </a:outerShdw>
+          </a:effectLst>
         </p:spPr>
       </p:pic>
       <p:sp>
@@ -8773,7 +9261,7 @@
           <a:p>
             <a:r>
               <a:rPr lang="en-US" dirty="0"/>
-              <a:t>Types of SSA: </a:t>
+              <a:t>Key Feature of SSA: </a:t>
             </a:r>
             <a:r>
               <a:rPr lang="en-US" dirty="0" err="1"/>
@@ -9545,6 +10033,41 @@
           </a:p>
         </p:txBody>
       </p:sp>
+      <p:sp>
+        <p:nvSpPr>
+          <p:cNvPr id="4" name="TextBox 3">
+            <a:extLst>
+              <a:ext uri="{FF2B5EF4-FFF2-40B4-BE49-F238E27FC236}">
+                <a16:creationId xmlns:a16="http://schemas.microsoft.com/office/drawing/2014/main" id="{81753F4D-2338-4FDD-B1B2-46E1A08693ED}"/>
+              </a:ext>
+            </a:extLst>
+          </p:cNvPr>
+          <p:cNvSpPr txBox="1"/>
+          <p:nvPr/>
+        </p:nvSpPr>
+        <p:spPr>
+          <a:xfrm>
+            <a:off x="7134225" y="5523521"/>
+            <a:ext cx="4432095" cy="461665"/>
+          </a:xfrm>
+          <a:prstGeom prst="rect">
+            <a:avLst/>
+          </a:prstGeom>
+          <a:noFill/>
+        </p:spPr>
+        <p:txBody>
+          <a:bodyPr wrap="square" rtlCol="0">
+            <a:spAutoFit/>
+          </a:bodyPr>
+          <a:lstStyle/>
+          <a:p>
+            <a:r>
+              <a:rPr lang="en-US" sz="1200" i="1" dirty="0"/>
+              <a:t>If there was only one cache, there would be a competition for resources among these two instructions</a:t>
+            </a:r>
+          </a:p>
+        </p:txBody>
+      </p:sp>
     </p:spTree>
     <p:extLst>
       <p:ext uri="{BB962C8B-B14F-4D97-AF65-F5344CB8AC3E}">
@@ -10058,7 +10581,7 @@
           <a:p>
             <a:r>
               <a:rPr lang="en-US" dirty="0"/>
-              <a:t> If an instruction’s length isn’t CONST, they cannot be fetched and used in parallel since an instruction has to be decoded. This means that </a:t>
+              <a:t> If an instruction’s length isn’t CONSTANT, they cannot be fetched and used in parallel since an instruction has to be decoded. This means that </a:t>
             </a:r>
             <a:r>
               <a:rPr lang="en-US" dirty="0" err="1"/>
@@ -10067,6 +10590,41 @@
             <a:r>
               <a:rPr lang="en-US" dirty="0"/>
               <a:t> is efficient for instructions with a fixed length and format.</a:t>
+            </a:r>
+          </a:p>
+        </p:txBody>
+      </p:sp>
+      <p:sp>
+        <p:nvSpPr>
+          <p:cNvPr id="4" name="TextBox 3">
+            <a:extLst>
+              <a:ext uri="{FF2B5EF4-FFF2-40B4-BE49-F238E27FC236}">
+                <a16:creationId xmlns:a16="http://schemas.microsoft.com/office/drawing/2014/main" id="{6F1AC326-6E4F-4CDA-AE4E-410380809992}"/>
+              </a:ext>
+            </a:extLst>
+          </p:cNvPr>
+          <p:cNvSpPr txBox="1"/>
+          <p:nvPr/>
+        </p:nvSpPr>
+        <p:spPr>
+          <a:xfrm>
+            <a:off x="7562088" y="4339389"/>
+            <a:ext cx="2847474" cy="461665"/>
+          </a:xfrm>
+          <a:prstGeom prst="rect">
+            <a:avLst/>
+          </a:prstGeom>
+          <a:noFill/>
+        </p:spPr>
+        <p:txBody>
+          <a:bodyPr wrap="square" rtlCol="0">
+            <a:spAutoFit/>
+          </a:bodyPr>
+          <a:lstStyle/>
+          <a:p>
+            <a:r>
+              <a:rPr lang="en-US" sz="1200" i="1" dirty="0"/>
+              <a:t>Branch Mispredictions could lead to control dependencies</a:t>
             </a:r>
           </a:p>
         </p:txBody>
@@ -10087,6 +10645,14 @@
 <file path=ppt/slides/slide8.xml><?xml version="1.0" encoding="utf-8"?>
 <p:sld xmlns:a="http://schemas.openxmlformats.org/drawingml/2006/main" xmlns:r="http://schemas.openxmlformats.org/officeDocument/2006/relationships" xmlns:p="http://schemas.openxmlformats.org/presentationml/2006/main">
   <p:cSld>
+    <p:bg>
+      <p:bgPr>
+        <a:solidFill>
+          <a:schemeClr val="bg2"/>
+        </a:solidFill>
+        <a:effectLst/>
+      </p:bgPr>
+    </p:bg>
     <p:spTree>
       <p:nvGrpSpPr>
         <p:cNvPr id="1" name=""/>
@@ -10101,6 +10667,367 @@
           <a:chExt cx="0" cy="0"/>
         </a:xfrm>
       </p:grpSpPr>
+      <p:sp useBgFill="1">
+        <p:nvSpPr>
+          <p:cNvPr id="10" name="Rectangle 9">
+            <a:extLst>
+              <a:ext uri="{FF2B5EF4-FFF2-40B4-BE49-F238E27FC236}">
+                <a16:creationId xmlns:a16="http://schemas.microsoft.com/office/drawing/2014/main" id="{5DD7D61F-A731-4BBE-9FE8-5C9E20066DD9}"/>
+              </a:ext>
+            </a:extLst>
+          </p:cNvPr>
+          <p:cNvSpPr>
+            <a:spLocks noGrp="1" noRot="1" noChangeAspect="1" noMove="1" noResize="1" noEditPoints="1" noAdjustHandles="1" noChangeArrowheads="1" noChangeShapeType="1" noTextEdit="1"/>
+          </p:cNvSpPr>
+          <p:nvPr>
+            <p:extLst>
+              <p:ext uri="{386F3935-93C4-4BCD-93E2-E3B085C9AB24}">
+                <p16:designElem xmlns:p16="http://schemas.microsoft.com/office/powerpoint/2015/main" val="1"/>
+              </p:ext>
+            </p:extLst>
+          </p:nvPr>
+        </p:nvSpPr>
+        <p:spPr>
+          <a:xfrm>
+            <a:off x="0" y="-786"/>
+            <a:ext cx="12192000" cy="6854038"/>
+          </a:xfrm>
+          <a:prstGeom prst="rect">
+            <a:avLst/>
+          </a:prstGeom>
+          <a:ln>
+            <a:noFill/>
+          </a:ln>
+        </p:spPr>
+        <p:style>
+          <a:lnRef idx="2">
+            <a:schemeClr val="accent1">
+              <a:shade val="50000"/>
+            </a:schemeClr>
+          </a:lnRef>
+          <a:fillRef idx="1">
+            <a:schemeClr val="accent1"/>
+          </a:fillRef>
+          <a:effectRef idx="0">
+            <a:schemeClr val="accent1"/>
+          </a:effectRef>
+          <a:fontRef idx="minor">
+            <a:schemeClr val="lt1"/>
+          </a:fontRef>
+        </p:style>
+        <p:txBody>
+          <a:bodyPr rtlCol="0" anchor="ctr"/>
+          <a:lstStyle/>
+          <a:p>
+            <a:pPr algn="ctr"/>
+            <a:endParaRPr lang="en-US"/>
+          </a:p>
+        </p:txBody>
+      </p:sp>
+      <p:sp>
+        <p:nvSpPr>
+          <p:cNvPr id="12" name="Rectangle 11">
+            <a:extLst>
+              <a:ext uri="{FF2B5EF4-FFF2-40B4-BE49-F238E27FC236}">
+                <a16:creationId xmlns:a16="http://schemas.microsoft.com/office/drawing/2014/main" id="{3150F9D2-6F39-4F5D-97AB-F71084ACA2CB}"/>
+              </a:ext>
+            </a:extLst>
+          </p:cNvPr>
+          <p:cNvSpPr>
+            <a:spLocks noGrp="1" noRot="1" noChangeAspect="1" noMove="1" noResize="1" noEditPoints="1" noAdjustHandles="1" noChangeArrowheads="1" noChangeShapeType="1" noTextEdit="1"/>
+          </p:cNvSpPr>
+          <p:nvPr>
+            <p:extLst>
+              <p:ext uri="{386F3935-93C4-4BCD-93E2-E3B085C9AB24}">
+                <p16:designElem xmlns:p16="http://schemas.microsoft.com/office/powerpoint/2015/main" val="1"/>
+              </p:ext>
+            </p:extLst>
+          </p:nvPr>
+        </p:nvSpPr>
+        <p:spPr>
+          <a:xfrm>
+            <a:off x="0" y="0"/>
+            <a:ext cx="182880" cy="6858000"/>
+          </a:xfrm>
+          <a:prstGeom prst="rect">
+            <a:avLst/>
+          </a:prstGeom>
+          <a:solidFill>
+            <a:schemeClr val="accent1"/>
+          </a:solidFill>
+          <a:ln>
+            <a:noFill/>
+          </a:ln>
+          <a:effectLst/>
+        </p:spPr>
+        <p:style>
+          <a:lnRef idx="1">
+            <a:schemeClr val="accent1"/>
+          </a:lnRef>
+          <a:fillRef idx="3">
+            <a:schemeClr val="accent1"/>
+          </a:fillRef>
+          <a:effectRef idx="2">
+            <a:schemeClr val="accent1"/>
+          </a:effectRef>
+          <a:fontRef idx="minor">
+            <a:schemeClr val="lt1"/>
+          </a:fontRef>
+        </p:style>
+      </p:sp>
+      <p:sp>
+        <p:nvSpPr>
+          <p:cNvPr id="14" name="Freeform 12">
+            <a:extLst>
+              <a:ext uri="{FF2B5EF4-FFF2-40B4-BE49-F238E27FC236}">
+                <a16:creationId xmlns:a16="http://schemas.microsoft.com/office/drawing/2014/main" id="{628745F1-A80D-4634-B1B3-0D5BB34332AD}"/>
+              </a:ext>
+            </a:extLst>
+          </p:cNvPr>
+          <p:cNvSpPr>
+            <a:spLocks noGrp="1" noRot="1" noChangeAspect="1" noMove="1" noResize="1" noEditPoints="1" noAdjustHandles="1" noChangeArrowheads="1" noChangeShapeType="1" noTextEdit="1"/>
+          </p:cNvSpPr>
+          <p:nvPr>
+            <p:extLst>
+              <p:ext uri="{386F3935-93C4-4BCD-93E2-E3B085C9AB24}">
+                <p16:designElem xmlns:p16="http://schemas.microsoft.com/office/powerpoint/2015/main" val="1"/>
+              </p:ext>
+            </p:extLst>
+          </p:nvPr>
+        </p:nvSpPr>
+        <p:spPr>
+          <a:xfrm>
+            <a:off x="-1" y="6061223"/>
+            <a:ext cx="1038036" cy="506277"/>
+          </a:xfrm>
+          <a:custGeom>
+            <a:avLst/>
+            <a:gdLst>
+              <a:gd name="connsiteX0" fmla="*/ 0 w 1038036"/>
+              <a:gd name="connsiteY0" fmla="*/ 0 h 506277"/>
+              <a:gd name="connsiteX1" fmla="*/ 182880 w 1038036"/>
+              <a:gd name="connsiteY1" fmla="*/ 0 h 506277"/>
+              <a:gd name="connsiteX2" fmla="*/ 291705 w 1038036"/>
+              <a:gd name="connsiteY2" fmla="*/ 0 h 506277"/>
+              <a:gd name="connsiteX3" fmla="*/ 291705 w 1038036"/>
+              <a:gd name="connsiteY3" fmla="*/ 151 h 506277"/>
+              <a:gd name="connsiteX4" fmla="*/ 692049 w 1038036"/>
+              <a:gd name="connsiteY4" fmla="*/ 705 h 506277"/>
+              <a:gd name="connsiteX5" fmla="*/ 782744 w 1038036"/>
+              <a:gd name="connsiteY5" fmla="*/ 705 h 506277"/>
+              <a:gd name="connsiteX6" fmla="*/ 797001 w 1038036"/>
+              <a:gd name="connsiteY6" fmla="*/ 5473 h 506277"/>
+              <a:gd name="connsiteX7" fmla="*/ 801982 w 1038036"/>
+              <a:gd name="connsiteY7" fmla="*/ 10242 h 506277"/>
+              <a:gd name="connsiteX8" fmla="*/ 1030951 w 1038036"/>
+              <a:gd name="connsiteY8" fmla="*/ 239185 h 506277"/>
+              <a:gd name="connsiteX9" fmla="*/ 1030951 w 1038036"/>
+              <a:gd name="connsiteY9" fmla="*/ 267797 h 506277"/>
+              <a:gd name="connsiteX10" fmla="*/ 801982 w 1038036"/>
+              <a:gd name="connsiteY10" fmla="*/ 496740 h 506277"/>
+              <a:gd name="connsiteX11" fmla="*/ 797001 w 1038036"/>
+              <a:gd name="connsiteY11" fmla="*/ 501508 h 506277"/>
+              <a:gd name="connsiteX12" fmla="*/ 782744 w 1038036"/>
+              <a:gd name="connsiteY12" fmla="*/ 506277 h 506277"/>
+              <a:gd name="connsiteX13" fmla="*/ 692049 w 1038036"/>
+              <a:gd name="connsiteY13" fmla="*/ 506277 h 506277"/>
+              <a:gd name="connsiteX14" fmla="*/ 291705 w 1038036"/>
+              <a:gd name="connsiteY14" fmla="*/ 505140 h 506277"/>
+              <a:gd name="connsiteX15" fmla="*/ 291705 w 1038036"/>
+              <a:gd name="connsiteY15" fmla="*/ 506277 h 506277"/>
+              <a:gd name="connsiteX16" fmla="*/ 0 w 1038036"/>
+              <a:gd name="connsiteY16" fmla="*/ 506277 h 506277"/>
+            </a:gdLst>
+            <a:ahLst/>
+            <a:cxnLst>
+              <a:cxn ang="0">
+                <a:pos x="connsiteX0" y="connsiteY0"/>
+              </a:cxn>
+              <a:cxn ang="0">
+                <a:pos x="connsiteX1" y="connsiteY1"/>
+              </a:cxn>
+              <a:cxn ang="0">
+                <a:pos x="connsiteX2" y="connsiteY2"/>
+              </a:cxn>
+              <a:cxn ang="0">
+                <a:pos x="connsiteX3" y="connsiteY3"/>
+              </a:cxn>
+              <a:cxn ang="0">
+                <a:pos x="connsiteX4" y="connsiteY4"/>
+              </a:cxn>
+              <a:cxn ang="0">
+                <a:pos x="connsiteX5" y="connsiteY5"/>
+              </a:cxn>
+              <a:cxn ang="0">
+                <a:pos x="connsiteX6" y="connsiteY6"/>
+              </a:cxn>
+              <a:cxn ang="0">
+                <a:pos x="connsiteX7" y="connsiteY7"/>
+              </a:cxn>
+              <a:cxn ang="0">
+                <a:pos x="connsiteX8" y="connsiteY8"/>
+              </a:cxn>
+              <a:cxn ang="0">
+                <a:pos x="connsiteX9" y="connsiteY9"/>
+              </a:cxn>
+              <a:cxn ang="0">
+                <a:pos x="connsiteX10" y="connsiteY10"/>
+              </a:cxn>
+              <a:cxn ang="0">
+                <a:pos x="connsiteX11" y="connsiteY11"/>
+              </a:cxn>
+              <a:cxn ang="0">
+                <a:pos x="connsiteX12" y="connsiteY12"/>
+              </a:cxn>
+              <a:cxn ang="0">
+                <a:pos x="connsiteX13" y="connsiteY13"/>
+              </a:cxn>
+              <a:cxn ang="0">
+                <a:pos x="connsiteX14" y="connsiteY14"/>
+              </a:cxn>
+              <a:cxn ang="0">
+                <a:pos x="connsiteX15" y="connsiteY15"/>
+              </a:cxn>
+              <a:cxn ang="0">
+                <a:pos x="connsiteX16" y="connsiteY16"/>
+              </a:cxn>
+            </a:cxnLst>
+            <a:rect l="l" t="t" r="r" b="b"/>
+            <a:pathLst>
+              <a:path w="1038036" h="506277">
+                <a:moveTo>
+                  <a:pt x="0" y="0"/>
+                </a:moveTo>
+                <a:lnTo>
+                  <a:pt x="182880" y="0"/>
+                </a:lnTo>
+                <a:lnTo>
+                  <a:pt x="291705" y="0"/>
+                </a:lnTo>
+                <a:lnTo>
+                  <a:pt x="291705" y="151"/>
+                </a:lnTo>
+                <a:lnTo>
+                  <a:pt x="692049" y="705"/>
+                </a:lnTo>
+                <a:lnTo>
+                  <a:pt x="782744" y="705"/>
+                </a:lnTo>
+                <a:cubicBezTo>
+                  <a:pt x="787553" y="705"/>
+                  <a:pt x="792363" y="5473"/>
+                  <a:pt x="797001" y="5473"/>
+                </a:cubicBezTo>
+                <a:cubicBezTo>
+                  <a:pt x="797001" y="10242"/>
+                  <a:pt x="801982" y="10242"/>
+                  <a:pt x="801982" y="10242"/>
+                </a:cubicBezTo>
+                <a:lnTo>
+                  <a:pt x="1030951" y="239185"/>
+                </a:lnTo>
+                <a:cubicBezTo>
+                  <a:pt x="1040398" y="248722"/>
+                  <a:pt x="1040398" y="258259"/>
+                  <a:pt x="1030951" y="267797"/>
+                </a:cubicBezTo>
+                <a:lnTo>
+                  <a:pt x="801982" y="496740"/>
+                </a:lnTo>
+                <a:cubicBezTo>
+                  <a:pt x="800436" y="498363"/>
+                  <a:pt x="798547" y="499885"/>
+                  <a:pt x="797001" y="501508"/>
+                </a:cubicBezTo>
+                <a:cubicBezTo>
+                  <a:pt x="792363" y="506277"/>
+                  <a:pt x="787553" y="506277"/>
+                  <a:pt x="782744" y="506277"/>
+                </a:cubicBezTo>
+                <a:lnTo>
+                  <a:pt x="692049" y="506277"/>
+                </a:lnTo>
+                <a:lnTo>
+                  <a:pt x="291705" y="505140"/>
+                </a:lnTo>
+                <a:lnTo>
+                  <a:pt x="291705" y="506277"/>
+                </a:lnTo>
+                <a:lnTo>
+                  <a:pt x="0" y="506277"/>
+                </a:lnTo>
+                <a:close/>
+              </a:path>
+            </a:pathLst>
+          </a:custGeom>
+          <a:ln>
+            <a:noFill/>
+          </a:ln>
+        </p:spPr>
+        <p:style>
+          <a:lnRef idx="2">
+            <a:schemeClr val="accent1">
+              <a:shade val="50000"/>
+            </a:schemeClr>
+          </a:lnRef>
+          <a:fillRef idx="1">
+            <a:schemeClr val="accent1"/>
+          </a:fillRef>
+          <a:effectRef idx="0">
+            <a:schemeClr val="accent1"/>
+          </a:effectRef>
+          <a:fontRef idx="minor">
+            <a:schemeClr val="lt1"/>
+          </a:fontRef>
+        </p:style>
+        <p:txBody>
+          <a:bodyPr rtlCol="0" anchor="ctr"/>
+          <a:lstStyle/>
+          <a:p>
+            <a:pPr algn="ctr"/>
+            <a:endParaRPr lang="en-US"/>
+          </a:p>
+        </p:txBody>
+      </p:sp>
+      <p:pic>
+        <p:nvPicPr>
+          <p:cNvPr id="5" name="Picture 4" descr="A screenshot of a cell phone&#10;&#10;Description generated with very high confidence">
+            <a:extLst>
+              <a:ext uri="{FF2B5EF4-FFF2-40B4-BE49-F238E27FC236}">
+                <a16:creationId xmlns:a16="http://schemas.microsoft.com/office/drawing/2014/main" id="{C918995C-EE8C-4EEA-B312-024E4FF09092}"/>
+              </a:ext>
+            </a:extLst>
+          </p:cNvPr>
+          <p:cNvPicPr>
+            <a:picLocks noChangeAspect="1"/>
+          </p:cNvPicPr>
+          <p:nvPr/>
+        </p:nvPicPr>
+        <p:blipFill rotWithShape="1">
+          <a:blip r:embed="rId2"/>
+          <a:srcRect l="9373" r="12711" b="-3"/>
+          <a:stretch/>
+        </p:blipFill>
+        <p:spPr>
+          <a:xfrm>
+            <a:off x="6091916" y="645106"/>
+            <a:ext cx="5451627" cy="5247747"/>
+          </a:xfrm>
+          <a:prstGeom prst="rect">
+            <a:avLst/>
+          </a:prstGeom>
+          <a:ln>
+            <a:noFill/>
+          </a:ln>
+          <a:effectLst>
+            <a:outerShdw blurRad="190500" algn="tl" rotWithShape="0">
+              <a:srgbClr val="000000">
+                <a:alpha val="70000"/>
+              </a:srgbClr>
+            </a:outerShdw>
+          </a:effectLst>
+        </p:spPr>
+      </p:pic>
       <p:sp>
         <p:nvSpPr>
           <p:cNvPr id="2" name="Title 1">
@@ -10117,9 +11044,16 @@
             <p:ph type="title"/>
           </p:nvPr>
         </p:nvSpPr>
-        <p:spPr/>
-        <p:txBody>
-          <a:bodyPr/>
+        <p:spPr>
+          <a:xfrm>
+            <a:off x="649224" y="645106"/>
+            <a:ext cx="5122652" cy="1259894"/>
+          </a:xfrm>
+        </p:spPr>
+        <p:txBody>
+          <a:bodyPr>
+            <a:normAutofit/>
+          </a:bodyPr>
           <a:lstStyle/>
           <a:p>
             <a:r>
@@ -10145,12 +11079,66 @@
             <p:ph idx="1"/>
           </p:nvPr>
         </p:nvSpPr>
-        <p:spPr/>
-        <p:txBody>
-          <a:bodyPr/>
+        <p:spPr>
+          <a:xfrm>
+            <a:off x="649225" y="2133600"/>
+            <a:ext cx="5122652" cy="3759253"/>
+          </a:xfrm>
+        </p:spPr>
+        <p:txBody>
+          <a:bodyPr>
+            <a:normAutofit/>
+          </a:bodyPr>
           <a:lstStyle/>
           <a:p>
+            <a:r>
+              <a:rPr lang="en-US" dirty="0"/>
+              <a:t>Similar to data hazards in pipelines, a data dependency occurs when the pipeline changes the order of read/write access to operands so that the order differs from the order seen by sequentially instructions.</a:t>
+            </a:r>
+          </a:p>
+          <a:p>
             <a:endParaRPr lang="en-US" dirty="0"/>
+          </a:p>
+          <a:p>
+            <a:r>
+              <a:rPr lang="en-US" dirty="0"/>
+              <a:t>Because of the fragile nature of data dependencies, conflicts have to be handled much more carefully than other dependencies</a:t>
+            </a:r>
+          </a:p>
+        </p:txBody>
+      </p:sp>
+      <p:sp>
+        <p:nvSpPr>
+          <p:cNvPr id="6" name="TextBox 5">
+            <a:extLst>
+              <a:ext uri="{FF2B5EF4-FFF2-40B4-BE49-F238E27FC236}">
+                <a16:creationId xmlns:a16="http://schemas.microsoft.com/office/drawing/2014/main" id="{7A9C7E30-DF4B-4393-AF0D-F252BD88256C}"/>
+              </a:ext>
+            </a:extLst>
+          </p:cNvPr>
+          <p:cNvSpPr txBox="1"/>
+          <p:nvPr/>
+        </p:nvSpPr>
+        <p:spPr>
+          <a:xfrm>
+            <a:off x="6821281" y="4820653"/>
+            <a:ext cx="5694948" cy="276999"/>
+          </a:xfrm>
+          <a:prstGeom prst="rect">
+            <a:avLst/>
+          </a:prstGeom>
+          <a:noFill/>
+        </p:spPr>
+        <p:txBody>
+          <a:bodyPr wrap="square" rtlCol="0">
+            <a:spAutoFit/>
+          </a:bodyPr>
+          <a:lstStyle/>
+          <a:p>
+            <a:r>
+              <a:rPr lang="en-US" sz="1200" i="1" dirty="0"/>
+              <a:t>Pipeline must wait for ‘D’ to finish before it can sub</a:t>
+            </a:r>
           </a:p>
         </p:txBody>
       </p:sp>
@@ -10158,6 +11146,175 @@
     <p:extLst>
       <p:ext uri="{BB962C8B-B14F-4D97-AF65-F5344CB8AC3E}">
         <p14:creationId xmlns:p14="http://schemas.microsoft.com/office/powerpoint/2010/main" val="4138714619"/>
+      </p:ext>
+    </p:extLst>
+  </p:cSld>
+  <p:clrMapOvr>
+    <a:masterClrMapping/>
+  </p:clrMapOvr>
+</p:sld>
+</file>
+
+<file path=ppt/slides/slide9.xml><?xml version="1.0" encoding="utf-8"?>
+<p:sld xmlns:a="http://schemas.openxmlformats.org/drawingml/2006/main" xmlns:r="http://schemas.openxmlformats.org/officeDocument/2006/relationships" xmlns:p="http://schemas.openxmlformats.org/presentationml/2006/main">
+  <p:cSld>
+    <p:spTree>
+      <p:nvGrpSpPr>
+        <p:cNvPr id="1" name=""/>
+        <p:cNvGrpSpPr/>
+        <p:nvPr/>
+      </p:nvGrpSpPr>
+      <p:grpSpPr>
+        <a:xfrm>
+          <a:off x="0" y="0"/>
+          <a:ext cx="0" cy="0"/>
+          <a:chOff x="0" y="0"/>
+          <a:chExt cx="0" cy="0"/>
+        </a:xfrm>
+      </p:grpSpPr>
+      <p:sp>
+        <p:nvSpPr>
+          <p:cNvPr id="2" name="Title 1">
+            <a:extLst>
+              <a:ext uri="{FF2B5EF4-FFF2-40B4-BE49-F238E27FC236}">
+                <a16:creationId xmlns:a16="http://schemas.microsoft.com/office/drawing/2014/main" id="{7FD4D13C-CBFA-48FD-B82A-A03E76EAFE0E}"/>
+              </a:ext>
+            </a:extLst>
+          </p:cNvPr>
+          <p:cNvSpPr>
+            <a:spLocks noGrp="1"/>
+          </p:cNvSpPr>
+          <p:nvPr>
+            <p:ph type="title"/>
+          </p:nvPr>
+        </p:nvSpPr>
+        <p:spPr>
+          <a:xfrm>
+            <a:off x="2592925" y="616158"/>
+            <a:ext cx="8911687" cy="1280890"/>
+          </a:xfrm>
+        </p:spPr>
+        <p:txBody>
+          <a:bodyPr/>
+          <a:lstStyle/>
+          <a:p>
+            <a:r>
+              <a:rPr lang="en-US" dirty="0"/>
+              <a:t>How Does It Work?: </a:t>
+            </a:r>
+            <a:br>
+              <a:rPr lang="en-US" dirty="0"/>
+            </a:br>
+            <a:r>
+              <a:rPr lang="en-US" dirty="0"/>
+              <a:t>Division and Decoupling</a:t>
+            </a:r>
+          </a:p>
+        </p:txBody>
+      </p:sp>
+      <p:sp>
+        <p:nvSpPr>
+          <p:cNvPr id="3" name="Content Placeholder 2">
+            <a:extLst>
+              <a:ext uri="{FF2B5EF4-FFF2-40B4-BE49-F238E27FC236}">
+                <a16:creationId xmlns:a16="http://schemas.microsoft.com/office/drawing/2014/main" id="{CCF931A1-8F4F-4FC8-8F2B-D83F4447471B}"/>
+              </a:ext>
+            </a:extLst>
+          </p:cNvPr>
+          <p:cNvSpPr>
+            <a:spLocks noGrp="1"/>
+          </p:cNvSpPr>
+          <p:nvPr>
+            <p:ph idx="1"/>
+          </p:nvPr>
+        </p:nvSpPr>
+        <p:spPr/>
+        <p:txBody>
+          <a:bodyPr>
+            <a:normAutofit lnSpcReduction="10000"/>
+          </a:bodyPr>
+          <a:lstStyle/>
+          <a:p>
+            <a:r>
+              <a:rPr lang="en-US" dirty="0"/>
+              <a:t>To increase instruction-level-parallelism, we divide the instruction into smaller tasks and decouple them. In particular, there are three important events:</a:t>
+            </a:r>
+          </a:p>
+          <a:p>
+            <a:pPr marL="1257300" lvl="2" indent="-342900">
+              <a:buFont typeface="+mj-lt"/>
+              <a:buAutoNum type="arabicPeriod"/>
+            </a:pPr>
+            <a:r>
+              <a:rPr lang="en-US" dirty="0"/>
+              <a:t>Instruction Issue: where an instruction is created and starts execution</a:t>
+            </a:r>
+          </a:p>
+          <a:p>
+            <a:pPr marL="1257300" lvl="2" indent="-342900">
+              <a:buFont typeface="+mj-lt"/>
+              <a:buAutoNum type="arabicPeriod"/>
+            </a:pPr>
+            <a:r>
+              <a:rPr lang="en-US" dirty="0"/>
+              <a:t>Instruction Completion: an instruction has been completed</a:t>
+            </a:r>
+          </a:p>
+          <a:p>
+            <a:pPr marL="1257300" lvl="2" indent="-342900">
+              <a:buFont typeface="+mj-lt"/>
+              <a:buAutoNum type="arabicPeriod"/>
+            </a:pPr>
+            <a:r>
+              <a:rPr lang="en-US" dirty="0"/>
+              <a:t>Instruction Commit: the operation results are written back to the registers</a:t>
+            </a:r>
+          </a:p>
+          <a:p>
+            <a:r>
+              <a:rPr lang="en-US" dirty="0"/>
+              <a:t>Because of the parallelism, instructions can be executed in a different order each run, but the results must be the same each time. Because of this, execution policies are used:</a:t>
+            </a:r>
+          </a:p>
+          <a:p>
+            <a:pPr marL="1257300" lvl="2" indent="-342900">
+              <a:buFont typeface="+mj-lt"/>
+              <a:buAutoNum type="arabicPeriod"/>
+            </a:pPr>
+            <a:r>
+              <a:rPr lang="en-US" dirty="0"/>
+              <a:t>In-Order Issue with In-Order Completion</a:t>
+            </a:r>
+          </a:p>
+          <a:p>
+            <a:pPr marL="1257300" lvl="2" indent="-342900">
+              <a:buFont typeface="+mj-lt"/>
+              <a:buAutoNum type="arabicPeriod"/>
+            </a:pPr>
+            <a:r>
+              <a:rPr lang="en-US" dirty="0"/>
+              <a:t>In-Order Issue with Out-Of-Order Completion</a:t>
+            </a:r>
+          </a:p>
+          <a:p>
+            <a:pPr marL="1257300" lvl="2" indent="-342900">
+              <a:buFont typeface="+mj-lt"/>
+              <a:buAutoNum type="arabicPeriod"/>
+            </a:pPr>
+            <a:r>
+              <a:rPr lang="en-US" dirty="0"/>
+              <a:t>Out-Of-Order Issue with Out-Of-Order Completion</a:t>
+            </a:r>
+          </a:p>
+          <a:p>
+            <a:endParaRPr lang="en-US" dirty="0"/>
+          </a:p>
+        </p:txBody>
+      </p:sp>
+    </p:spTree>
+    <p:extLst>
+      <p:ext uri="{BB962C8B-B14F-4D97-AF65-F5344CB8AC3E}">
+        <p14:creationId xmlns:p14="http://schemas.microsoft.com/office/powerpoint/2010/main" val="201082334"/>
       </p:ext>
     </p:extLst>
   </p:cSld>

</xml_diff>